<commit_message>
change to presentation + routes
</commit_message>
<xml_diff>
--- a/Green Giants.pptx
+++ b/Green Giants.pptx
@@ -108,6 +108,11 @@
       </a:defRPr>
     </a:lvl9pPr>
   </p:defaultTextStyle>
+  <p:extLst>
+    <p:ext uri="{EFAFB233-063F-42B5-8137-9DF3F51BA10A}">
+      <p15:sldGuideLst xmlns:p15="http://schemas.microsoft.com/office/powerpoint/2012/main"/>
+    </p:ext>
+  </p:extLst>
 </p:presentation>
 </file>
 
@@ -260,7 +265,7 @@
           <a:p>
             <a:fld id="{BADAA60A-789E-403F-8BBA-95277A4AEF55}" type="datetimeFigureOut">
               <a:rPr lang="en-IE" smtClean="0"/>
-              <a:t>29/01/2023</a:t>
+              <a:t>31/01/2023</a:t>
             </a:fld>
             <a:endParaRPr lang="en-IE"/>
           </a:p>
@@ -460,7 +465,7 @@
           <a:p>
             <a:fld id="{BADAA60A-789E-403F-8BBA-95277A4AEF55}" type="datetimeFigureOut">
               <a:rPr lang="en-IE" smtClean="0"/>
-              <a:t>29/01/2023</a:t>
+              <a:t>31/01/2023</a:t>
             </a:fld>
             <a:endParaRPr lang="en-IE"/>
           </a:p>
@@ -670,7 +675,7 @@
           <a:p>
             <a:fld id="{BADAA60A-789E-403F-8BBA-95277A4AEF55}" type="datetimeFigureOut">
               <a:rPr lang="en-IE" smtClean="0"/>
-              <a:t>29/01/2023</a:t>
+              <a:t>31/01/2023</a:t>
             </a:fld>
             <a:endParaRPr lang="en-IE"/>
           </a:p>
@@ -870,7 +875,7 @@
           <a:p>
             <a:fld id="{BADAA60A-789E-403F-8BBA-95277A4AEF55}" type="datetimeFigureOut">
               <a:rPr lang="en-IE" smtClean="0"/>
-              <a:t>29/01/2023</a:t>
+              <a:t>31/01/2023</a:t>
             </a:fld>
             <a:endParaRPr lang="en-IE"/>
           </a:p>
@@ -1146,7 +1151,7 @@
           <a:p>
             <a:fld id="{BADAA60A-789E-403F-8BBA-95277A4AEF55}" type="datetimeFigureOut">
               <a:rPr lang="en-IE" smtClean="0"/>
-              <a:t>29/01/2023</a:t>
+              <a:t>31/01/2023</a:t>
             </a:fld>
             <a:endParaRPr lang="en-IE"/>
           </a:p>
@@ -1414,7 +1419,7 @@
           <a:p>
             <a:fld id="{BADAA60A-789E-403F-8BBA-95277A4AEF55}" type="datetimeFigureOut">
               <a:rPr lang="en-IE" smtClean="0"/>
-              <a:t>29/01/2023</a:t>
+              <a:t>31/01/2023</a:t>
             </a:fld>
             <a:endParaRPr lang="en-IE"/>
           </a:p>
@@ -1829,7 +1834,7 @@
           <a:p>
             <a:fld id="{BADAA60A-789E-403F-8BBA-95277A4AEF55}" type="datetimeFigureOut">
               <a:rPr lang="en-IE" smtClean="0"/>
-              <a:t>29/01/2023</a:t>
+              <a:t>31/01/2023</a:t>
             </a:fld>
             <a:endParaRPr lang="en-IE"/>
           </a:p>
@@ -1971,7 +1976,7 @@
           <a:p>
             <a:fld id="{BADAA60A-789E-403F-8BBA-95277A4AEF55}" type="datetimeFigureOut">
               <a:rPr lang="en-IE" smtClean="0"/>
-              <a:t>29/01/2023</a:t>
+              <a:t>31/01/2023</a:t>
             </a:fld>
             <a:endParaRPr lang="en-IE"/>
           </a:p>
@@ -2084,7 +2089,7 @@
           <a:p>
             <a:fld id="{BADAA60A-789E-403F-8BBA-95277A4AEF55}" type="datetimeFigureOut">
               <a:rPr lang="en-IE" smtClean="0"/>
-              <a:t>29/01/2023</a:t>
+              <a:t>31/01/2023</a:t>
             </a:fld>
             <a:endParaRPr lang="en-IE"/>
           </a:p>
@@ -2397,7 +2402,7 @@
           <a:p>
             <a:fld id="{BADAA60A-789E-403F-8BBA-95277A4AEF55}" type="datetimeFigureOut">
               <a:rPr lang="en-IE" smtClean="0"/>
-              <a:t>29/01/2023</a:t>
+              <a:t>31/01/2023</a:t>
             </a:fld>
             <a:endParaRPr lang="en-IE"/>
           </a:p>
@@ -2686,7 +2691,7 @@
           <a:p>
             <a:fld id="{BADAA60A-789E-403F-8BBA-95277A4AEF55}" type="datetimeFigureOut">
               <a:rPr lang="en-IE" smtClean="0"/>
-              <a:t>29/01/2023</a:t>
+              <a:t>31/01/2023</a:t>
             </a:fld>
             <a:endParaRPr lang="en-IE"/>
           </a:p>
@@ -2929,7 +2934,7 @@
           <a:p>
             <a:fld id="{BADAA60A-789E-403F-8BBA-95277A4AEF55}" type="datetimeFigureOut">
               <a:rPr lang="en-IE" smtClean="0"/>
-              <a:t>29/01/2023</a:t>
+              <a:t>31/01/2023</a:t>
             </a:fld>
             <a:endParaRPr lang="en-IE"/>
           </a:p>
@@ -3809,6 +3814,24 @@
               <a:t>GITHUB</a:t>
             </a:r>
           </a:p>
+          <a:p>
+            <a:r>
+              <a:rPr lang="en-IE" dirty="0"/>
+              <a:t>Python</a:t>
+            </a:r>
+          </a:p>
+          <a:p>
+            <a:r>
+              <a:rPr lang="en-IE" dirty="0"/>
+              <a:t>Flask</a:t>
+            </a:r>
+          </a:p>
+          <a:p>
+            <a:r>
+              <a:rPr lang="en-IE" dirty="0"/>
+              <a:t>Mongo(will be updated to SQL)</a:t>
+            </a:r>
+          </a:p>
         </p:txBody>
       </p:sp>
     </p:spTree>

</xml_diff>